<commit_message>
detalhe slide do lucas de banco
</commit_message>
<xml_diff>
--- a/Apresentação/inSensorSemFinal.pptx
+++ b/Apresentação/inSensorSemFinal.pptx
@@ -5876,6 +5876,13 @@
   <p:clrMapOvr>
     <a:masterClrMapping/>
   </p:clrMapOvr>
+  <p:timing>
+    <p:tnLst>
+      <p:par>
+        <p:cTn id="1" dur="indefinite" restart="never" nodeType="tmRoot"/>
+      </p:par>
+    </p:tnLst>
+  </p:timing>
 </p:sld>
 </file>
 
@@ -6246,7 +6253,7 @@
         <p:spPr>
           <a:xfrm>
             <a:off x="5155032" y="2686142"/>
-            <a:ext cx="4672218" cy="584775"/>
+            <a:ext cx="6630568" cy="584775"/>
           </a:xfrm>
           <a:prstGeom prst="rect">
             <a:avLst/>
@@ -6260,9 +6267,12 @@
           </a:bodyPr>
           <a:lstStyle/>
           <a:p>
-            <a:pPr algn="just"/>
+            <a:pPr marL="457200" indent="-457200" algn="just">
+              <a:buFont typeface="Arial" panose="020B0604020202020204" pitchFamily="34" charset="0"/>
+              <a:buChar char="•"/>
+            </a:pPr>
             <a:r>
-              <a:rPr lang="pt-BR" sz="3200" b="1" cap="none" spc="0" dirty="0">
+              <a:rPr lang="pt-BR" sz="3200" b="1" cap="none" spc="0" dirty="0" smtClean="0">
                 <a:ln w="0"/>
                 <a:solidFill>
                   <a:schemeClr val="bg1"/>
@@ -6278,6 +6288,20 @@
               </a:rPr>
               <a:t>ALTA DISPONIBILIDADE</a:t>
             </a:r>
+            <a:endParaRPr lang="pt-BR" sz="3200" b="1" cap="none" spc="0" dirty="0">
+              <a:ln w="0"/>
+              <a:solidFill>
+                <a:schemeClr val="bg1"/>
+              </a:solidFill>
+              <a:effectLst>
+                <a:outerShdw blurRad="38100" dist="19050" dir="2700000" algn="tl" rotWithShape="0">
+                  <a:schemeClr val="dk1">
+                    <a:alpha val="40000"/>
+                  </a:schemeClr>
+                </a:outerShdw>
+              </a:effectLst>
+              <a:latin typeface="Exo 2 Extra Light" panose="00000300000000000000" pitchFamily="2" charset="0"/>
+            </a:endParaRPr>
           </a:p>
         </p:txBody>
       </p:sp>
@@ -6304,7 +6328,10 @@
           </a:bodyPr>
           <a:lstStyle/>
           <a:p>
-            <a:pPr algn="just"/>
+            <a:pPr marL="457200" indent="-457200" algn="just">
+              <a:buFont typeface="Arial" panose="020B0604020202020204" pitchFamily="34" charset="0"/>
+              <a:buChar char="•"/>
+            </a:pPr>
             <a:r>
               <a:rPr lang="pt-BR" sz="3200" b="1" cap="none" spc="0" dirty="0">
                 <a:ln w="0"/>
@@ -6348,7 +6375,10 @@
           </a:bodyPr>
           <a:lstStyle/>
           <a:p>
-            <a:pPr algn="just"/>
+            <a:pPr marL="457200" indent="-457200" algn="just">
+              <a:buFont typeface="Arial" panose="020B0604020202020204" pitchFamily="34" charset="0"/>
+              <a:buChar char="•"/>
+            </a:pPr>
             <a:r>
               <a:rPr lang="pt-BR" sz="3200" b="1" dirty="0">
                 <a:ln w="0"/>
@@ -6393,6 +6423,13 @@
   <p:clrMapOvr>
     <a:masterClrMapping/>
   </p:clrMapOvr>
+  <p:timing>
+    <p:tnLst>
+      <p:par>
+        <p:cTn id="1" dur="indefinite" restart="never" nodeType="tmRoot"/>
+      </p:par>
+    </p:tnLst>
+  </p:timing>
 </p:sld>
 </file>
 
@@ -6670,6 +6707,13 @@
   <p:clrMapOvr>
     <a:masterClrMapping/>
   </p:clrMapOvr>
+  <p:timing>
+    <p:tnLst>
+      <p:par>
+        <p:cTn id="1" dur="indefinite" restart="never" nodeType="tmRoot"/>
+      </p:par>
+    </p:tnLst>
+  </p:timing>
 </p:sld>
 </file>
 
@@ -8556,6 +8600,13 @@
   <p:clrMapOvr>
     <a:masterClrMapping/>
   </p:clrMapOvr>
+  <p:timing>
+    <p:tnLst>
+      <p:par>
+        <p:cTn id="1" dur="indefinite" restart="never" nodeType="tmRoot"/>
+      </p:par>
+    </p:tnLst>
+  </p:timing>
 </p:sld>
 </file>
 

</xml_diff>